<commit_message>
den borde presetera liiiite bättre nu, tidsmässigt
</commit_message>
<xml_diff>
--- a/powerpointer/matchrapporter/20220221 Vetlanda BK - IK Sirius halvlek 2 .pptx
+++ b/powerpointer/matchrapporter/20220221 Vetlanda BK - IK Sirius halvlek 2 .pptx
@@ -3127,7 +3127,7 @@
               </a:defRPr>
             </a:pPr>
             <a:r>
-              <a:t>IK Sirius - Vetlanda BK</a:t>
+              <a:t>Vetlanda BK - IK Sirius</a:t>
             </a:r>
           </a:p>
         </p:txBody>
@@ -3155,14 +3155,14 @@
               </a:defRPr>
             </a:pPr>
             <a:r>
-              <a:t>1 - 0</a:t>
+              <a:t>0 - 1</a:t>
             </a:r>
           </a:p>
         </p:txBody>
       </p:sp>
       <p:pic>
         <p:nvPicPr>
-          <p:cNvPr id="4" name="Picture 3" descr="sirius logo.png"/>
+          <p:cNvPr id="4" name="Picture 3" descr="vetlanda logo.png"/>
           <p:cNvPicPr>
             <a:picLocks noChangeAspect="1"/>
           </p:cNvPicPr>
@@ -3186,7 +3186,7 @@
       </p:pic>
       <p:pic>
         <p:nvPicPr>
-          <p:cNvPr id="5" name="Picture 4" descr="vetlanda logo.png"/>
+          <p:cNvPr id="5" name="Picture 4" descr="sirius logo.png"/>
           <p:cNvPicPr>
             <a:picLocks noChangeAspect="1"/>
           </p:cNvPicPr>
@@ -3273,12 +3273,12 @@
             <a:pPr>
               <a:defRPr>
                 <a:solidFill>
-                  <a:srgbClr val="000000"/>
+                  <a:srgbClr val="FF0000"/>
                 </a:solidFill>
               </a:defRPr>
             </a:pPr>
             <a:r>
-              <a:t>Sirius</a:t>
+              <a:t>Vetlanda</a:t>
             </a:r>
           </a:p>
         </p:txBody>
@@ -3302,7 +3302,7 @@
             <a:pPr>
               <a:defRPr>
                 <a:solidFill>
-                  <a:srgbClr val="000000"/>
+                  <a:srgbClr val="FF0000"/>
                 </a:solidFill>
               </a:defRPr>
             </a:pPr>
@@ -3311,14 +3311,14 @@
             </a:r>
             <a:br/>
             <a:r>
-              <a:t>	1</a:t>
+              <a:t>	0</a:t>
             </a:r>
           </a:p>
           <a:p>
             <a:pPr>
               <a:defRPr>
                 <a:solidFill>
-                  <a:srgbClr val="000000"/>
+                  <a:srgbClr val="FF0000"/>
                 </a:solidFill>
               </a:defRPr>
             </a:pPr>
@@ -3327,14 +3327,14 @@
             </a:r>
             <a:br/>
             <a:r>
-              <a:t>	6</a:t>
+              <a:t>	4</a:t>
             </a:r>
           </a:p>
           <a:p>
             <a:pPr>
               <a:defRPr>
                 <a:solidFill>
-                  <a:srgbClr val="000000"/>
+                  <a:srgbClr val="FF0000"/>
                 </a:solidFill>
               </a:defRPr>
             </a:pPr>
@@ -3343,7 +3343,7 @@
             </a:r>
             <a:br/>
             <a:r>
-              <a:t>	0:20:33 (50 %)</a:t>
+              <a:t>	0:20:27 (50 %)</a:t>
             </a:r>
           </a:p>
         </p:txBody>
@@ -3366,12 +3366,12 @@
             <a:pPr>
               <a:defRPr>
                 <a:solidFill>
-                  <a:srgbClr val="FF0000"/>
+                  <a:srgbClr val="000000"/>
                 </a:solidFill>
               </a:defRPr>
             </a:pPr>
             <a:r>
-              <a:t>Vetlanda</a:t>
+              <a:t>Sirius</a:t>
             </a:r>
           </a:p>
         </p:txBody>
@@ -3395,7 +3395,7 @@
             <a:pPr>
               <a:defRPr>
                 <a:solidFill>
-                  <a:srgbClr val="FF0000"/>
+                  <a:srgbClr val="000000"/>
                 </a:solidFill>
               </a:defRPr>
             </a:pPr>
@@ -3404,14 +3404,14 @@
             </a:r>
             <a:br/>
             <a:r>
-              <a:t>	0</a:t>
+              <a:t>	1</a:t>
             </a:r>
           </a:p>
           <a:p>
             <a:pPr>
               <a:defRPr>
                 <a:solidFill>
-                  <a:srgbClr val="FF0000"/>
+                  <a:srgbClr val="000000"/>
                 </a:solidFill>
               </a:defRPr>
             </a:pPr>
@@ -3420,14 +3420,14 @@
             </a:r>
             <a:br/>
             <a:r>
-              <a:t>	4</a:t>
+              <a:t>	6</a:t>
             </a:r>
           </a:p>
           <a:p>
             <a:pPr>
               <a:defRPr>
                 <a:solidFill>
-                  <a:srgbClr val="FF0000"/>
+                  <a:srgbClr val="000000"/>
                 </a:solidFill>
               </a:defRPr>
             </a:pPr>
@@ -3436,14 +3436,14 @@
             </a:r>
             <a:br/>
             <a:r>
-              <a:t>	0:20:28 (50 %)</a:t>
+              <a:t>	0:20:32 (50 %)</a:t>
             </a:r>
           </a:p>
         </p:txBody>
       </p:sp>
       <p:pic>
         <p:nvPicPr>
-          <p:cNvPr id="7" name="Picture 6" descr="sirius logo.png"/>
+          <p:cNvPr id="7" name="Picture 6" descr="vetlanda logo.png"/>
           <p:cNvPicPr>
             <a:picLocks noChangeAspect="1"/>
           </p:cNvPicPr>
@@ -3467,7 +3467,7 @@
       </p:pic>
       <p:pic>
         <p:nvPicPr>
-          <p:cNvPr id="8" name="Picture 7" descr="vetlanda logo.png"/>
+          <p:cNvPr id="8" name="Picture 7" descr="sirius logo.png"/>
           <p:cNvPicPr>
             <a:picLocks noChangeAspect="1"/>
           </p:cNvPicPr>
@@ -3554,12 +3554,12 @@
             <a:pPr>
               <a:defRPr>
                 <a:solidFill>
-                  <a:srgbClr val="000000"/>
+                  <a:srgbClr val="FF0000"/>
                 </a:solidFill>
               </a:defRPr>
             </a:pPr>
             <a:r>
-              <a:t>Sirius</a:t>
+              <a:t>Vetlanda</a:t>
             </a:r>
           </a:p>
         </p:txBody>
@@ -3583,7 +3583,7 @@
             <a:pPr>
               <a:defRPr>
                 <a:solidFill>
-                  <a:srgbClr val="000000"/>
+                  <a:srgbClr val="FF0000"/>
                 </a:solidFill>
               </a:defRPr>
             </a:pPr>
@@ -3592,14 +3592,14 @@
             </a:r>
             <a:br/>
             <a:r>
-              <a:t>	16</a:t>
+              <a:t>	23</a:t>
             </a:r>
           </a:p>
           <a:p>
             <a:pPr>
               <a:defRPr>
                 <a:solidFill>
-                  <a:srgbClr val="000000"/>
+                  <a:srgbClr val="FF0000"/>
                 </a:solidFill>
               </a:defRPr>
             </a:pPr>
@@ -3608,14 +3608,14 @@
             </a:r>
             <a:br/>
             <a:r>
-              <a:t>	2</a:t>
+              <a:t>	4</a:t>
             </a:r>
           </a:p>
           <a:p>
             <a:pPr>
               <a:defRPr>
                 <a:solidFill>
-                  <a:srgbClr val="000000"/>
+                  <a:srgbClr val="FF0000"/>
                 </a:solidFill>
               </a:defRPr>
             </a:pPr>
@@ -3624,7 +3624,7 @@
             </a:r>
             <a:br/>
             <a:r>
-              <a:t>	1</a:t>
+              <a:t>	0</a:t>
             </a:r>
           </a:p>
         </p:txBody>
@@ -3647,12 +3647,12 @@
             <a:pPr>
               <a:defRPr>
                 <a:solidFill>
-                  <a:srgbClr val="FF0000"/>
+                  <a:srgbClr val="000000"/>
                 </a:solidFill>
               </a:defRPr>
             </a:pPr>
             <a:r>
-              <a:t>Vetlanda</a:t>
+              <a:t>Sirius</a:t>
             </a:r>
           </a:p>
         </p:txBody>
@@ -3676,7 +3676,7 @@
             <a:pPr>
               <a:defRPr>
                 <a:solidFill>
-                  <a:srgbClr val="FF0000"/>
+                  <a:srgbClr val="000000"/>
                 </a:solidFill>
               </a:defRPr>
             </a:pPr>
@@ -3685,14 +3685,14 @@
             </a:r>
             <a:br/>
             <a:r>
-              <a:t>	23</a:t>
+              <a:t>	16</a:t>
             </a:r>
           </a:p>
           <a:p>
             <a:pPr>
               <a:defRPr>
                 <a:solidFill>
-                  <a:srgbClr val="FF0000"/>
+                  <a:srgbClr val="000000"/>
                 </a:solidFill>
               </a:defRPr>
             </a:pPr>
@@ -3701,14 +3701,14 @@
             </a:r>
             <a:br/>
             <a:r>
-              <a:t>	4</a:t>
+              <a:t>	2</a:t>
             </a:r>
           </a:p>
           <a:p>
             <a:pPr>
               <a:defRPr>
                 <a:solidFill>
-                  <a:srgbClr val="FF0000"/>
+                  <a:srgbClr val="000000"/>
                 </a:solidFill>
               </a:defRPr>
             </a:pPr>
@@ -3717,14 +3717,14 @@
             </a:r>
             <a:br/>
             <a:r>
-              <a:t>	0</a:t>
+              <a:t>	1</a:t>
             </a:r>
           </a:p>
         </p:txBody>
       </p:sp>
       <p:pic>
         <p:nvPicPr>
-          <p:cNvPr id="7" name="Picture 6" descr="sirius logo.png"/>
+          <p:cNvPr id="7" name="Picture 6" descr="vetlanda logo.png"/>
           <p:cNvPicPr>
             <a:picLocks noChangeAspect="1"/>
           </p:cNvPicPr>
@@ -3748,7 +3748,7 @@
       </p:pic>
       <p:pic>
         <p:nvPicPr>
-          <p:cNvPr id="8" name="Picture 7" descr="vetlanda logo.png"/>
+          <p:cNvPr id="8" name="Picture 7" descr="sirius logo.png"/>
           <p:cNvPicPr>
             <a:picLocks noChangeAspect="1"/>
           </p:cNvPicPr>
@@ -3824,7 +3824,7 @@
       </p:sp>
       <p:pic>
         <p:nvPicPr>
-          <p:cNvPr id="3" name="Picture 2" descr="sirius logo.png"/>
+          <p:cNvPr id="3" name="Picture 2" descr="vetlanda logo.png"/>
           <p:cNvPicPr>
             <a:picLocks noChangeAspect="1"/>
           </p:cNvPicPr>
@@ -3848,7 +3848,7 @@
       </p:pic>
       <p:pic>
         <p:nvPicPr>
-          <p:cNvPr id="4" name="Picture 3" descr="vetlanda logo.png"/>
+          <p:cNvPr id="4" name="Picture 3" descr="sirius logo.png"/>
           <p:cNvPicPr>
             <a:picLocks noChangeAspect="1"/>
           </p:cNvPicPr>
@@ -3916,12 +3916,12 @@
                       <a:pPr algn="ctr">
                         <a:defRPr sz="2500" b="1">
                           <a:solidFill>
-                            <a:srgbClr val="000000"/>
+                            <a:srgbClr val="FF0000"/>
                           </a:solidFill>
                         </a:defRPr>
                       </a:pPr>
                       <a:r>
-                        <a:t>Efter Sirius</a:t>
+                        <a:t>Efter Vetlanda</a:t>
                       </a:r>
                     </a:p>
                   </a:txBody>
@@ -3937,17 +3937,78 @@
                       <a:pPr algn="ctr">
                         <a:defRPr sz="2500" b="1">
                           <a:solidFill>
+                            <a:srgbClr val="000000"/>
+                          </a:solidFill>
+                        </a:defRPr>
+                      </a:pPr>
+                      <a:r>
+                        <a:t>Efter Sirius</a:t>
+                      </a:r>
+                    </a:p>
+                  </a:txBody>
+                  <a:tcPr anchor="ctr">
+                    <a:noFill/>
+                  </a:tcPr>
+                </a:tc>
+              </a:tr>
+              <a:tr h="1219200">
+                <a:tc>
+                  <a:txBody>
+                    <a:bodyPr/>
+                    <a:lstStyle/>
+                    <a:p>
+                      <a:pPr algn="ctr">
+                        <a:defRPr sz="2500" b="1">
+                          <a:solidFill>
                             <a:srgbClr val="FF0000"/>
                           </a:solidFill>
                         </a:defRPr>
                       </a:pPr>
                       <a:r>
-                        <a:t>Efter Vetlanda</a:t>
+                        <a:t>Före Vetlanda</a:t>
                       </a:r>
                     </a:p>
                   </a:txBody>
                   <a:tcPr anchor="ctr">
                     <a:noFill/>
+                  </a:tcPr>
+                </a:tc>
+                <a:tc>
+                  <a:txBody>
+                    <a:bodyPr/>
+                    <a:lstStyle/>
+                    <a:p>
+                      <a:pPr algn="ctr">
+                        <a:defRPr sz="2500" b="1"/>
+                      </a:pPr>
+                      <a:r>
+                        <a:t>9</a:t>
+                      </a:r>
+                    </a:p>
+                  </a:txBody>
+                  <a:tcPr anchor="ctr">
+                    <a:solidFill>
+                      <a:srgbClr val="FFF532"/>
+                    </a:solidFill>
+                  </a:tcPr>
+                </a:tc>
+                <a:tc>
+                  <a:txBody>
+                    <a:bodyPr/>
+                    <a:lstStyle/>
+                    <a:p>
+                      <a:pPr algn="ctr">
+                        <a:defRPr sz="2500" b="1"/>
+                      </a:pPr>
+                      <a:r>
+                        <a:t>15</a:t>
+                      </a:r>
+                    </a:p>
+                  </a:txBody>
+                  <a:tcPr anchor="ctr">
+                    <a:solidFill>
+                      <a:srgbClr val="B8CA99"/>
+                    </a:solidFill>
                   </a:tcPr>
                 </a:tc>
               </a:tr>
@@ -3982,68 +4043,7 @@
                         <a:defRPr sz="2500" b="1"/>
                       </a:pPr>
                       <a:r>
-                        <a:t>3</a:t>
-                      </a:r>
-                    </a:p>
-                  </a:txBody>
-                  <a:tcPr anchor="ctr">
-                    <a:solidFill>
-                      <a:srgbClr val="427CBC"/>
-                    </a:solidFill>
-                  </a:tcPr>
-                </a:tc>
-                <a:tc>
-                  <a:txBody>
-                    <a:bodyPr/>
-                    <a:lstStyle/>
-                    <a:p>
-                      <a:pPr algn="ctr">
-                        <a:defRPr sz="2500" b="1"/>
-                      </a:pPr>
-                      <a:r>
                         <a:t>18</a:t>
-                      </a:r>
-                    </a:p>
-                  </a:txBody>
-                  <a:tcPr anchor="ctr">
-                    <a:solidFill>
-                      <a:srgbClr val="B8CA99"/>
-                    </a:solidFill>
-                  </a:tcPr>
-                </a:tc>
-              </a:tr>
-              <a:tr h="1219200">
-                <a:tc>
-                  <a:txBody>
-                    <a:bodyPr/>
-                    <a:lstStyle/>
-                    <a:p>
-                      <a:pPr algn="ctr">
-                        <a:defRPr sz="2500" b="1">
-                          <a:solidFill>
-                            <a:srgbClr val="FF0000"/>
-                          </a:solidFill>
-                        </a:defRPr>
-                      </a:pPr>
-                      <a:r>
-                        <a:t>Före Vetlanda</a:t>
-                      </a:r>
-                    </a:p>
-                  </a:txBody>
-                  <a:tcPr anchor="ctr">
-                    <a:noFill/>
-                  </a:tcPr>
-                </a:tc>
-                <a:tc>
-                  <a:txBody>
-                    <a:bodyPr/>
-                    <a:lstStyle/>
-                    <a:p>
-                      <a:pPr algn="ctr">
-                        <a:defRPr sz="2500" b="1"/>
-                      </a:pPr>
-                      <a:r>
-                        <a:t>15</a:t>
                       </a:r>
                     </a:p>
                   </a:txBody>
@@ -4062,13 +4062,13 @@
                         <a:defRPr sz="2500" b="1"/>
                       </a:pPr>
                       <a:r>
-                        <a:t>9</a:t>
+                        <a:t>3</a:t>
                       </a:r>
                     </a:p>
                   </a:txBody>
                   <a:tcPr anchor="ctr">
                     <a:solidFill>
-                      <a:srgbClr val="FFF532"/>
+                      <a:srgbClr val="427CBC"/>
                     </a:solidFill>
                   </a:tcPr>
                 </a:tc>
@@ -4147,12 +4147,12 @@
             <a:pPr>
               <a:defRPr>
                 <a:solidFill>
-                  <a:srgbClr val="000000"/>
+                  <a:srgbClr val="FF0000"/>
                 </a:solidFill>
               </a:defRPr>
             </a:pPr>
             <a:r>
-              <a:t>Sirius - skottförsök: 15</a:t>
+              <a:t>Vetlanda - skottförsök: 13</a:t>
             </a:r>
           </a:p>
         </p:txBody>
@@ -4176,72 +4176,72 @@
             <a:pPr>
               <a:defRPr>
                 <a:solidFill>
-                  <a:srgbClr val="000000"/>
+                  <a:srgbClr val="FF0000"/>
                 </a:solidFill>
               </a:defRPr>
             </a:pPr>
             <a:r>
-              <a:t>Centralt: 3</a:t>
+              <a:t>Centralt: 1</a:t>
             </a:r>
           </a:p>
           <a:p>
             <a:pPr>
               <a:defRPr>
                 <a:solidFill>
-                  <a:srgbClr val="000000"/>
+                  <a:srgbClr val="FF0000"/>
                 </a:solidFill>
               </a:defRPr>
             </a:pPr>
             <a:r>
-              <a:t>Fast: 6</a:t>
+              <a:t>Fast: 4</a:t>
             </a:r>
           </a:p>
           <a:p>
             <a:pPr>
               <a:defRPr>
                 <a:solidFill>
-                  <a:srgbClr val="000000"/>
+                  <a:srgbClr val="FF0000"/>
                 </a:solidFill>
               </a:defRPr>
             </a:pPr>
             <a:r>
-              <a:t>Friställande: 0</a:t>
+              <a:t>Friställande: 2</a:t>
             </a:r>
           </a:p>
           <a:p>
             <a:pPr>
               <a:defRPr>
                 <a:solidFill>
-                  <a:srgbClr val="000000"/>
+                  <a:srgbClr val="FF0000"/>
                 </a:solidFill>
               </a:defRPr>
             </a:pPr>
             <a:r>
-              <a:t>Inlägg: 1</a:t>
+              <a:t>Inlägg: 2</a:t>
             </a:r>
           </a:p>
           <a:p>
             <a:pPr>
               <a:defRPr>
                 <a:solidFill>
-                  <a:srgbClr val="000000"/>
+                  <a:srgbClr val="FF0000"/>
                 </a:solidFill>
               </a:defRPr>
             </a:pPr>
             <a:r>
-              <a:t>Retur: 0</a:t>
+              <a:t>Retur: 1</a:t>
             </a:r>
           </a:p>
           <a:p>
             <a:pPr>
               <a:defRPr>
                 <a:solidFill>
-                  <a:srgbClr val="000000"/>
+                  <a:srgbClr val="FF0000"/>
                 </a:solidFill>
               </a:defRPr>
             </a:pPr>
             <a:r>
-              <a:t>Utifrån: 5</a:t>
+              <a:t>Utifrån: 3</a:t>
             </a:r>
           </a:p>
         </p:txBody>
@@ -4264,12 +4264,12 @@
             <a:pPr>
               <a:defRPr>
                 <a:solidFill>
-                  <a:srgbClr val="FF0000"/>
+                  <a:srgbClr val="000000"/>
                 </a:solidFill>
               </a:defRPr>
             </a:pPr>
             <a:r>
-              <a:t>Vetlanda - skottförsök: 13</a:t>
+              <a:t>Sirius - skottförsök: 15</a:t>
             </a:r>
           </a:p>
         </p:txBody>
@@ -4293,79 +4293,79 @@
             <a:pPr>
               <a:defRPr>
                 <a:solidFill>
-                  <a:srgbClr val="FF0000"/>
+                  <a:srgbClr val="000000"/>
                 </a:solidFill>
               </a:defRPr>
             </a:pPr>
             <a:r>
-              <a:t>Centralt: 1</a:t>
+              <a:t>Centralt: 3</a:t>
             </a:r>
           </a:p>
           <a:p>
             <a:pPr>
               <a:defRPr>
                 <a:solidFill>
-                  <a:srgbClr val="FF0000"/>
+                  <a:srgbClr val="000000"/>
                 </a:solidFill>
               </a:defRPr>
             </a:pPr>
             <a:r>
-              <a:t>Fast: 4</a:t>
+              <a:t>Fast: 6</a:t>
             </a:r>
           </a:p>
           <a:p>
             <a:pPr>
               <a:defRPr>
                 <a:solidFill>
-                  <a:srgbClr val="FF0000"/>
+                  <a:srgbClr val="000000"/>
                 </a:solidFill>
               </a:defRPr>
             </a:pPr>
             <a:r>
-              <a:t>Friställande: 2</a:t>
+              <a:t>Friställande: 0</a:t>
             </a:r>
           </a:p>
           <a:p>
             <a:pPr>
               <a:defRPr>
                 <a:solidFill>
-                  <a:srgbClr val="FF0000"/>
+                  <a:srgbClr val="000000"/>
                 </a:solidFill>
               </a:defRPr>
             </a:pPr>
             <a:r>
-              <a:t>Inlägg: 2</a:t>
+              <a:t>Inlägg: 1</a:t>
             </a:r>
           </a:p>
           <a:p>
             <a:pPr>
               <a:defRPr>
                 <a:solidFill>
-                  <a:srgbClr val="FF0000"/>
+                  <a:srgbClr val="000000"/>
                 </a:solidFill>
               </a:defRPr>
             </a:pPr>
             <a:r>
-              <a:t>Retur: 1</a:t>
+              <a:t>Retur: 0</a:t>
             </a:r>
           </a:p>
           <a:p>
             <a:pPr>
               <a:defRPr>
                 <a:solidFill>
-                  <a:srgbClr val="FF0000"/>
+                  <a:srgbClr val="000000"/>
                 </a:solidFill>
               </a:defRPr>
             </a:pPr>
             <a:r>
-              <a:t>Utifrån: 3</a:t>
+              <a:t>Utifrån: 5</a:t>
             </a:r>
           </a:p>
         </p:txBody>
       </p:sp>
       <p:pic>
         <p:nvPicPr>
-          <p:cNvPr id="7" name="Picture 6" descr="sirius logo.png"/>
+          <p:cNvPr id="7" name="Picture 6" descr="vetlanda logo.png"/>
           <p:cNvPicPr>
             <a:picLocks noChangeAspect="1"/>
           </p:cNvPicPr>
@@ -4389,7 +4389,7 @@
       </p:pic>
       <p:pic>
         <p:nvPicPr>
-          <p:cNvPr id="8" name="Picture 7" descr="vetlanda logo.png"/>
+          <p:cNvPr id="8" name="Picture 7" descr="sirius logo.png"/>
           <p:cNvPicPr>
             <a:picLocks noChangeAspect="1"/>
           </p:cNvPicPr>
@@ -4489,7 +4489,7 @@
       </p:sp>
       <p:pic>
         <p:nvPicPr>
-          <p:cNvPr id="4" name="Picture 3" descr="sirius logo.png"/>
+          <p:cNvPr id="4" name="Picture 3" descr="vetlanda logo.png"/>
           <p:cNvPicPr>
             <a:picLocks noChangeAspect="1"/>
           </p:cNvPicPr>
@@ -4513,7 +4513,7 @@
       </p:pic>
       <p:pic>
         <p:nvPicPr>
-          <p:cNvPr id="5" name="Picture 4" descr="vetlanda logo.png"/>
+          <p:cNvPr id="5" name="Picture 4" descr="sirius logo.png"/>
           <p:cNvPicPr>
             <a:picLocks noChangeAspect="1"/>
           </p:cNvPicPr>

</xml_diff>